<commit_message>
Updated system architecture diagrams, added proto3 message table, updated TODO
</commit_message>
<xml_diff>
--- a/documentation/detail_design/figs/sw_arch_communication.pptx
+++ b/documentation/detail_design/figs/sw_arch_communication.pptx
@@ -243,7 +243,7 @@
           <a:p>
             <a:fld id="{22A9501E-8B98-4D26-B52A-80110765E259}" type="datetimeFigureOut">
               <a:rPr lang="en-US" smtClean="0"/>
-              <a:t>12/6/2016</a:t>
+              <a:t>12/13/2016</a:t>
             </a:fld>
             <a:endParaRPr lang="en-US"/>
           </a:p>
@@ -413,7 +413,7 @@
           <a:p>
             <a:fld id="{22A9501E-8B98-4D26-B52A-80110765E259}" type="datetimeFigureOut">
               <a:rPr lang="en-US" smtClean="0"/>
-              <a:t>12/6/2016</a:t>
+              <a:t>12/13/2016</a:t>
             </a:fld>
             <a:endParaRPr lang="en-US"/>
           </a:p>
@@ -593,7 +593,7 @@
           <a:p>
             <a:fld id="{22A9501E-8B98-4D26-B52A-80110765E259}" type="datetimeFigureOut">
               <a:rPr lang="en-US" smtClean="0"/>
-              <a:t>12/6/2016</a:t>
+              <a:t>12/13/2016</a:t>
             </a:fld>
             <a:endParaRPr lang="en-US"/>
           </a:p>
@@ -763,7 +763,7 @@
           <a:p>
             <a:fld id="{22A9501E-8B98-4D26-B52A-80110765E259}" type="datetimeFigureOut">
               <a:rPr lang="en-US" smtClean="0"/>
-              <a:t>12/6/2016</a:t>
+              <a:t>12/13/2016</a:t>
             </a:fld>
             <a:endParaRPr lang="en-US"/>
           </a:p>
@@ -1009,7 +1009,7 @@
           <a:p>
             <a:fld id="{22A9501E-8B98-4D26-B52A-80110765E259}" type="datetimeFigureOut">
               <a:rPr lang="en-US" smtClean="0"/>
-              <a:t>12/6/2016</a:t>
+              <a:t>12/13/2016</a:t>
             </a:fld>
             <a:endParaRPr lang="en-US"/>
           </a:p>
@@ -1241,7 +1241,7 @@
           <a:p>
             <a:fld id="{22A9501E-8B98-4D26-B52A-80110765E259}" type="datetimeFigureOut">
               <a:rPr lang="en-US" smtClean="0"/>
-              <a:t>12/6/2016</a:t>
+              <a:t>12/13/2016</a:t>
             </a:fld>
             <a:endParaRPr lang="en-US"/>
           </a:p>
@@ -1608,7 +1608,7 @@
           <a:p>
             <a:fld id="{22A9501E-8B98-4D26-B52A-80110765E259}" type="datetimeFigureOut">
               <a:rPr lang="en-US" smtClean="0"/>
-              <a:t>12/6/2016</a:t>
+              <a:t>12/13/2016</a:t>
             </a:fld>
             <a:endParaRPr lang="en-US"/>
           </a:p>
@@ -1726,7 +1726,7 @@
           <a:p>
             <a:fld id="{22A9501E-8B98-4D26-B52A-80110765E259}" type="datetimeFigureOut">
               <a:rPr lang="en-US" smtClean="0"/>
-              <a:t>12/6/2016</a:t>
+              <a:t>12/13/2016</a:t>
             </a:fld>
             <a:endParaRPr lang="en-US"/>
           </a:p>
@@ -1821,7 +1821,7 @@
           <a:p>
             <a:fld id="{22A9501E-8B98-4D26-B52A-80110765E259}" type="datetimeFigureOut">
               <a:rPr lang="en-US" smtClean="0"/>
-              <a:t>12/6/2016</a:t>
+              <a:t>12/13/2016</a:t>
             </a:fld>
             <a:endParaRPr lang="en-US"/>
           </a:p>
@@ -2098,7 +2098,7 @@
           <a:p>
             <a:fld id="{22A9501E-8B98-4D26-B52A-80110765E259}" type="datetimeFigureOut">
               <a:rPr lang="en-US" smtClean="0"/>
-              <a:t>12/6/2016</a:t>
+              <a:t>12/13/2016</a:t>
             </a:fld>
             <a:endParaRPr lang="en-US"/>
           </a:p>
@@ -2351,7 +2351,7 @@
           <a:p>
             <a:fld id="{22A9501E-8B98-4D26-B52A-80110765E259}" type="datetimeFigureOut">
               <a:rPr lang="en-US" smtClean="0"/>
-              <a:t>12/6/2016</a:t>
+              <a:t>12/13/2016</a:t>
             </a:fld>
             <a:endParaRPr lang="en-US"/>
           </a:p>
@@ -2564,7 +2564,7 @@
           <a:p>
             <a:fld id="{22A9501E-8B98-4D26-B52A-80110765E259}" type="datetimeFigureOut">
               <a:rPr lang="en-US" smtClean="0"/>
-              <a:t>12/6/2016</a:t>
+              <a:t>12/13/2016</a:t>
             </a:fld>
             <a:endParaRPr lang="en-US"/>
           </a:p>
@@ -4697,6 +4697,284 @@
           </a:fontRef>
         </p:style>
       </p:cxnSp>
+      <p:grpSp>
+        <p:nvGrpSpPr>
+          <p:cNvPr id="10" name="Group 9"/>
+          <p:cNvGrpSpPr/>
+          <p:nvPr/>
+        </p:nvGrpSpPr>
+        <p:grpSpPr>
+          <a:xfrm>
+            <a:off x="1262022" y="4855899"/>
+            <a:ext cx="2240346" cy="1020406"/>
+            <a:chOff x="516835" y="4831065"/>
+            <a:chExt cx="2240346" cy="1020406"/>
+          </a:xfrm>
+        </p:grpSpPr>
+        <p:cxnSp>
+          <p:nvCxnSpPr>
+            <p:cNvPr id="3" name="Straight Connector 2"/>
+            <p:cNvCxnSpPr/>
+            <p:nvPr/>
+          </p:nvCxnSpPr>
+          <p:spPr>
+            <a:xfrm>
+              <a:off x="516835" y="4969565"/>
+              <a:ext cx="808382" cy="0"/>
+            </a:xfrm>
+            <a:prstGeom prst="line">
+              <a:avLst/>
+            </a:prstGeom>
+            <a:ln w="28575">
+              <a:solidFill>
+                <a:srgbClr val="FF0000"/>
+              </a:solidFill>
+            </a:ln>
+          </p:spPr>
+          <p:style>
+            <a:lnRef idx="1">
+              <a:schemeClr val="accent1"/>
+            </a:lnRef>
+            <a:fillRef idx="0">
+              <a:schemeClr val="accent1"/>
+            </a:fillRef>
+            <a:effectRef idx="0">
+              <a:schemeClr val="accent1"/>
+            </a:effectRef>
+            <a:fontRef idx="minor">
+              <a:schemeClr val="tx1"/>
+            </a:fontRef>
+          </p:style>
+        </p:cxnSp>
+        <p:cxnSp>
+          <p:nvCxnSpPr>
+            <p:cNvPr id="47" name="Straight Connector 46"/>
+            <p:cNvCxnSpPr/>
+            <p:nvPr/>
+          </p:nvCxnSpPr>
+          <p:spPr>
+            <a:xfrm>
+              <a:off x="516835" y="5233315"/>
+              <a:ext cx="808382" cy="0"/>
+            </a:xfrm>
+            <a:prstGeom prst="line">
+              <a:avLst/>
+            </a:prstGeom>
+            <a:ln w="28575">
+              <a:solidFill>
+                <a:srgbClr val="0070C0"/>
+              </a:solidFill>
+            </a:ln>
+          </p:spPr>
+          <p:style>
+            <a:lnRef idx="1">
+              <a:schemeClr val="accent1"/>
+            </a:lnRef>
+            <a:fillRef idx="0">
+              <a:schemeClr val="accent1"/>
+            </a:fillRef>
+            <a:effectRef idx="0">
+              <a:schemeClr val="accent1"/>
+            </a:effectRef>
+            <a:fontRef idx="minor">
+              <a:schemeClr val="tx1"/>
+            </a:fontRef>
+          </p:style>
+        </p:cxnSp>
+        <p:cxnSp>
+          <p:nvCxnSpPr>
+            <p:cNvPr id="48" name="Straight Connector 47"/>
+            <p:cNvCxnSpPr/>
+            <p:nvPr/>
+          </p:nvCxnSpPr>
+          <p:spPr>
+            <a:xfrm>
+              <a:off x="516835" y="5479768"/>
+              <a:ext cx="808382" cy="0"/>
+            </a:xfrm>
+            <a:prstGeom prst="line">
+              <a:avLst/>
+            </a:prstGeom>
+            <a:ln w="28575">
+              <a:solidFill>
+                <a:schemeClr val="accent4">
+                  <a:lumMod val="60000"/>
+                  <a:lumOff val="40000"/>
+                </a:schemeClr>
+              </a:solidFill>
+            </a:ln>
+          </p:spPr>
+          <p:style>
+            <a:lnRef idx="1">
+              <a:schemeClr val="accent1"/>
+            </a:lnRef>
+            <a:fillRef idx="0">
+              <a:schemeClr val="accent1"/>
+            </a:fillRef>
+            <a:effectRef idx="0">
+              <a:schemeClr val="accent1"/>
+            </a:effectRef>
+            <a:fontRef idx="minor">
+              <a:schemeClr val="tx1"/>
+            </a:fontRef>
+          </p:style>
+        </p:cxnSp>
+        <p:cxnSp>
+          <p:nvCxnSpPr>
+            <p:cNvPr id="49" name="Straight Connector 48"/>
+            <p:cNvCxnSpPr/>
+            <p:nvPr/>
+          </p:nvCxnSpPr>
+          <p:spPr>
+            <a:xfrm>
+              <a:off x="516835" y="5719163"/>
+              <a:ext cx="808382" cy="0"/>
+            </a:xfrm>
+            <a:prstGeom prst="line">
+              <a:avLst/>
+            </a:prstGeom>
+            <a:ln w="28575">
+              <a:solidFill>
+                <a:srgbClr val="00B050"/>
+              </a:solidFill>
+            </a:ln>
+          </p:spPr>
+          <p:style>
+            <a:lnRef idx="1">
+              <a:schemeClr val="accent1"/>
+            </a:lnRef>
+            <a:fillRef idx="0">
+              <a:schemeClr val="accent1"/>
+            </a:fillRef>
+            <a:effectRef idx="0">
+              <a:schemeClr val="accent1"/>
+            </a:effectRef>
+            <a:fontRef idx="minor">
+              <a:schemeClr val="tx1"/>
+            </a:fontRef>
+          </p:style>
+        </p:cxnSp>
+        <p:sp>
+          <p:nvSpPr>
+            <p:cNvPr id="9" name="TextBox 8"/>
+            <p:cNvSpPr txBox="1"/>
+            <p:nvPr/>
+          </p:nvSpPr>
+          <p:spPr>
+            <a:xfrm>
+              <a:off x="1393794" y="4831065"/>
+              <a:ext cx="556243" cy="276999"/>
+            </a:xfrm>
+            <a:prstGeom prst="rect">
+              <a:avLst/>
+            </a:prstGeom>
+            <a:noFill/>
+          </p:spPr>
+          <p:txBody>
+            <a:bodyPr wrap="none" rtlCol="0">
+              <a:spAutoFit/>
+            </a:bodyPr>
+            <a:lstStyle/>
+            <a:p>
+              <a:r>
+                <a:rPr lang="en-US" sz="1200" dirty="0" smtClean="0"/>
+                <a:t>Errors</a:t>
+              </a:r>
+              <a:endParaRPr lang="en-US" sz="1200" dirty="0"/>
+            </a:p>
+          </p:txBody>
+        </p:sp>
+        <p:sp>
+          <p:nvSpPr>
+            <p:cNvPr id="50" name="TextBox 49"/>
+            <p:cNvSpPr txBox="1"/>
+            <p:nvPr/>
+          </p:nvSpPr>
+          <p:spPr>
+            <a:xfrm>
+              <a:off x="1393794" y="5094815"/>
+              <a:ext cx="1363387" cy="276999"/>
+            </a:xfrm>
+            <a:prstGeom prst="rect">
+              <a:avLst/>
+            </a:prstGeom>
+            <a:noFill/>
+          </p:spPr>
+          <p:txBody>
+            <a:bodyPr wrap="none" rtlCol="0">
+              <a:spAutoFit/>
+            </a:bodyPr>
+            <a:lstStyle/>
+            <a:p>
+              <a:r>
+                <a:rPr lang="en-US" sz="1200" dirty="0" smtClean="0"/>
+                <a:t>Writing Implement</a:t>
+              </a:r>
+              <a:endParaRPr lang="en-US" sz="1200" dirty="0"/>
+            </a:p>
+          </p:txBody>
+        </p:sp>
+        <p:sp>
+          <p:nvSpPr>
+            <p:cNvPr id="51" name="TextBox 50"/>
+            <p:cNvSpPr txBox="1"/>
+            <p:nvPr/>
+          </p:nvSpPr>
+          <p:spPr>
+            <a:xfrm>
+              <a:off x="1393794" y="5341268"/>
+              <a:ext cx="930383" cy="276999"/>
+            </a:xfrm>
+            <a:prstGeom prst="rect">
+              <a:avLst/>
+            </a:prstGeom>
+            <a:noFill/>
+          </p:spPr>
+          <p:txBody>
+            <a:bodyPr wrap="none" rtlCol="0">
+              <a:spAutoFit/>
+            </a:bodyPr>
+            <a:lstStyle/>
+            <a:p>
+              <a:r>
+                <a:rPr lang="en-US" sz="1200" dirty="0" smtClean="0"/>
+                <a:t>Locomotion</a:t>
+              </a:r>
+              <a:endParaRPr lang="en-US" sz="1200" dirty="0"/>
+            </a:p>
+          </p:txBody>
+        </p:sp>
+        <p:sp>
+          <p:nvSpPr>
+            <p:cNvPr id="52" name="TextBox 51"/>
+            <p:cNvSpPr txBox="1"/>
+            <p:nvPr/>
+          </p:nvSpPr>
+          <p:spPr>
+            <a:xfrm>
+              <a:off x="1388866" y="5574472"/>
+              <a:ext cx="918393" cy="276999"/>
+            </a:xfrm>
+            <a:prstGeom prst="rect">
+              <a:avLst/>
+            </a:prstGeom>
+            <a:noFill/>
+          </p:spPr>
+          <p:txBody>
+            <a:bodyPr wrap="none" rtlCol="0">
+              <a:spAutoFit/>
+            </a:bodyPr>
+            <a:lstStyle/>
+            <a:p>
+              <a:r>
+                <a:rPr lang="en-US" sz="1200" dirty="0" smtClean="0"/>
+                <a:t>Localization</a:t>
+              </a:r>
+              <a:endParaRPr lang="en-US" sz="1200" dirty="0"/>
+            </a:p>
+          </p:txBody>
+        </p:sp>
+      </p:grpSp>
     </p:spTree>
     <p:extLst>
       <p:ext uri="{BB962C8B-B14F-4D97-AF65-F5344CB8AC3E}">

</xml_diff>

<commit_message>
Updated comm arch diagram
</commit_message>
<xml_diff>
--- a/documentation/detail_design/figs/sw_arch_communication.pptx
+++ b/documentation/detail_design/figs/sw_arch_communication.pptx
@@ -243,7 +243,7 @@
           <a:p>
             <a:fld id="{22A9501E-8B98-4D26-B52A-80110765E259}" type="datetimeFigureOut">
               <a:rPr lang="en-US" smtClean="0"/>
-              <a:t>12/13/2016</a:t>
+              <a:t>12/14/2016</a:t>
             </a:fld>
             <a:endParaRPr lang="en-US"/>
           </a:p>
@@ -413,7 +413,7 @@
           <a:p>
             <a:fld id="{22A9501E-8B98-4D26-B52A-80110765E259}" type="datetimeFigureOut">
               <a:rPr lang="en-US" smtClean="0"/>
-              <a:t>12/13/2016</a:t>
+              <a:t>12/14/2016</a:t>
             </a:fld>
             <a:endParaRPr lang="en-US"/>
           </a:p>
@@ -593,7 +593,7 @@
           <a:p>
             <a:fld id="{22A9501E-8B98-4D26-B52A-80110765E259}" type="datetimeFigureOut">
               <a:rPr lang="en-US" smtClean="0"/>
-              <a:t>12/13/2016</a:t>
+              <a:t>12/14/2016</a:t>
             </a:fld>
             <a:endParaRPr lang="en-US"/>
           </a:p>
@@ -763,7 +763,7 @@
           <a:p>
             <a:fld id="{22A9501E-8B98-4D26-B52A-80110765E259}" type="datetimeFigureOut">
               <a:rPr lang="en-US" smtClean="0"/>
-              <a:t>12/13/2016</a:t>
+              <a:t>12/14/2016</a:t>
             </a:fld>
             <a:endParaRPr lang="en-US"/>
           </a:p>
@@ -1009,7 +1009,7 @@
           <a:p>
             <a:fld id="{22A9501E-8B98-4D26-B52A-80110765E259}" type="datetimeFigureOut">
               <a:rPr lang="en-US" smtClean="0"/>
-              <a:t>12/13/2016</a:t>
+              <a:t>12/14/2016</a:t>
             </a:fld>
             <a:endParaRPr lang="en-US"/>
           </a:p>
@@ -1241,7 +1241,7 @@
           <a:p>
             <a:fld id="{22A9501E-8B98-4D26-B52A-80110765E259}" type="datetimeFigureOut">
               <a:rPr lang="en-US" smtClean="0"/>
-              <a:t>12/13/2016</a:t>
+              <a:t>12/14/2016</a:t>
             </a:fld>
             <a:endParaRPr lang="en-US"/>
           </a:p>
@@ -1608,7 +1608,7 @@
           <a:p>
             <a:fld id="{22A9501E-8B98-4D26-B52A-80110765E259}" type="datetimeFigureOut">
               <a:rPr lang="en-US" smtClean="0"/>
-              <a:t>12/13/2016</a:t>
+              <a:t>12/14/2016</a:t>
             </a:fld>
             <a:endParaRPr lang="en-US"/>
           </a:p>
@@ -1726,7 +1726,7 @@
           <a:p>
             <a:fld id="{22A9501E-8B98-4D26-B52A-80110765E259}" type="datetimeFigureOut">
               <a:rPr lang="en-US" smtClean="0"/>
-              <a:t>12/13/2016</a:t>
+              <a:t>12/14/2016</a:t>
             </a:fld>
             <a:endParaRPr lang="en-US"/>
           </a:p>
@@ -1821,7 +1821,7 @@
           <a:p>
             <a:fld id="{22A9501E-8B98-4D26-B52A-80110765E259}" type="datetimeFigureOut">
               <a:rPr lang="en-US" smtClean="0"/>
-              <a:t>12/13/2016</a:t>
+              <a:t>12/14/2016</a:t>
             </a:fld>
             <a:endParaRPr lang="en-US"/>
           </a:p>
@@ -2098,7 +2098,7 @@
           <a:p>
             <a:fld id="{22A9501E-8B98-4D26-B52A-80110765E259}" type="datetimeFigureOut">
               <a:rPr lang="en-US" smtClean="0"/>
-              <a:t>12/13/2016</a:t>
+              <a:t>12/14/2016</a:t>
             </a:fld>
             <a:endParaRPr lang="en-US"/>
           </a:p>
@@ -2351,7 +2351,7 @@
           <a:p>
             <a:fld id="{22A9501E-8B98-4D26-B52A-80110765E259}" type="datetimeFigureOut">
               <a:rPr lang="en-US" smtClean="0"/>
-              <a:t>12/13/2016</a:t>
+              <a:t>12/14/2016</a:t>
             </a:fld>
             <a:endParaRPr lang="en-US"/>
           </a:p>
@@ -2564,7 +2564,7 @@
           <a:p>
             <a:fld id="{22A9501E-8B98-4D26-B52A-80110765E259}" type="datetimeFigureOut">
               <a:rPr lang="en-US" smtClean="0"/>
-              <a:t>12/13/2016</a:t>
+              <a:t>12/14/2016</a:t>
             </a:fld>
             <a:endParaRPr lang="en-US"/>
           </a:p>
@@ -3550,7 +3550,7 @@
                   <a:srgbClr val="000000"/>
                 </a:solidFill>
               </a:rPr>
-              <a:t>Localization</a:t>
+              <a:t>Debug &amp; Error logs</a:t>
             </a:r>
             <a:endParaRPr lang="en-US" sz="1200" dirty="0">
               <a:solidFill>
@@ -3602,12 +3602,20 @@
           <a:p>
             <a:pPr algn="ctr"/>
             <a:r>
+              <a:rPr lang="en-US" sz="1200" dirty="0" err="1" smtClean="0">
+                <a:solidFill>
+                  <a:srgbClr val="000000"/>
+                </a:solidFill>
+              </a:rPr>
+              <a:t>Odometry</a:t>
+            </a:r>
+            <a:r>
               <a:rPr lang="en-US" sz="1200" dirty="0" smtClean="0">
                 <a:solidFill>
                   <a:srgbClr val="000000"/>
                 </a:solidFill>
               </a:rPr>
-              <a:t>Motor Feedback</a:t>
+              <a:t> Data</a:t>
             </a:r>
             <a:endParaRPr lang="en-US" sz="1200" dirty="0">
               <a:solidFill>
@@ -3722,63 +3730,6 @@
                 </a:solidFill>
               </a:rPr>
               <a:t>Motor Encoder Data</a:t>
-            </a:r>
-            <a:endParaRPr lang="en-US" sz="1200" dirty="0">
-              <a:solidFill>
-                <a:srgbClr val="000000"/>
-              </a:solidFill>
-            </a:endParaRPr>
-          </a:p>
-        </p:txBody>
-      </p:sp>
-      <p:sp>
-        <p:nvSpPr>
-          <p:cNvPr id="28" name="Rectangle 27"/>
-          <p:cNvSpPr/>
-          <p:nvPr/>
-        </p:nvSpPr>
-        <p:spPr>
-          <a:xfrm>
-            <a:off x="8434892" y="1025184"/>
-            <a:ext cx="1097280" cy="623869"/>
-          </a:xfrm>
-          <a:prstGeom prst="rect">
-            <a:avLst/>
-          </a:prstGeom>
-          <a:noFill/>
-          <a:ln>
-            <a:solidFill>
-              <a:schemeClr val="tx1"/>
-            </a:solidFill>
-          </a:ln>
-          <a:effectLst/>
-        </p:spPr>
-        <p:style>
-          <a:lnRef idx="1">
-            <a:schemeClr val="accent1"/>
-          </a:lnRef>
-          <a:fillRef idx="3">
-            <a:schemeClr val="accent1"/>
-          </a:fillRef>
-          <a:effectRef idx="2">
-            <a:schemeClr val="accent1"/>
-          </a:effectRef>
-          <a:fontRef idx="minor">
-            <a:schemeClr val="lt1"/>
-          </a:fontRef>
-        </p:style>
-        <p:txBody>
-          <a:bodyPr anchor="ctr" anchorCtr="0"/>
-          <a:lstStyle/>
-          <a:p>
-            <a:pPr algn="ctr"/>
-            <a:r>
-              <a:rPr lang="en-US" sz="1200" dirty="0" smtClean="0">
-                <a:solidFill>
-                  <a:srgbClr val="000000"/>
-                </a:solidFill>
-              </a:rPr>
-              <a:t>Drive Locomotion Motors</a:t>
             </a:r>
             <a:endParaRPr lang="en-US" sz="1200" dirty="0">
               <a:solidFill>
@@ -4296,46 +4247,10 @@
           </a:prstGeom>
           <a:ln w="25400">
             <a:solidFill>
-              <a:srgbClr val="FFC000"/>
+              <a:schemeClr val="accent6"/>
             </a:solidFill>
             <a:tailEnd type="arrow"/>
           </a:ln>
-        </p:spPr>
-        <p:style>
-          <a:lnRef idx="1">
-            <a:schemeClr val="accent1"/>
-          </a:lnRef>
-          <a:fillRef idx="0">
-            <a:schemeClr val="accent1"/>
-          </a:fillRef>
-          <a:effectRef idx="0">
-            <a:schemeClr val="accent1"/>
-          </a:effectRef>
-          <a:fontRef idx="minor">
-            <a:schemeClr val="tx1"/>
-          </a:fontRef>
-        </p:style>
-      </p:cxnSp>
-      <p:cxnSp>
-        <p:nvCxnSpPr>
-          <p:cNvPr id="116" name="Straight Connector 115"/>
-          <p:cNvCxnSpPr/>
-          <p:nvPr/>
-        </p:nvCxnSpPr>
-        <p:spPr>
-          <a:xfrm flipH="1">
-            <a:off x="9533760" y="3070860"/>
-            <a:ext cx="1673352" cy="0"/>
-          </a:xfrm>
-          <a:prstGeom prst="line">
-            <a:avLst/>
-          </a:prstGeom>
-          <a:ln w="25400">
-            <a:solidFill>
-              <a:srgbClr val="FF0000"/>
-            </a:solidFill>
-          </a:ln>
-          <a:effectLst/>
         </p:spPr>
         <p:style>
           <a:lnRef idx="1">
@@ -4405,43 +4320,6 @@
           <a:ln w="25400">
             <a:solidFill>
               <a:schemeClr val="accent5"/>
-            </a:solidFill>
-            <a:tailEnd type="arrow"/>
-          </a:ln>
-          <a:effectLst/>
-        </p:spPr>
-        <p:style>
-          <a:lnRef idx="2">
-            <a:schemeClr val="accent1"/>
-          </a:lnRef>
-          <a:fillRef idx="0">
-            <a:schemeClr val="accent1"/>
-          </a:fillRef>
-          <a:effectRef idx="1">
-            <a:schemeClr val="accent1"/>
-          </a:effectRef>
-          <a:fontRef idx="minor">
-            <a:schemeClr val="tx1"/>
-          </a:fontRef>
-        </p:style>
-      </p:cxnSp>
-      <p:cxnSp>
-        <p:nvCxnSpPr>
-          <p:cNvPr id="129" name="Straight Arrow Connector 128"/>
-          <p:cNvCxnSpPr/>
-          <p:nvPr/>
-        </p:nvCxnSpPr>
-        <p:spPr>
-          <a:xfrm flipV="1">
-            <a:off x="11201400" y="2607995"/>
-            <a:ext cx="0" cy="466344"/>
-          </a:xfrm>
-          <a:prstGeom prst="straightConnector1">
-            <a:avLst/>
-          </a:prstGeom>
-          <a:ln w="25400">
-            <a:solidFill>
-              <a:srgbClr val="FF0000"/>
             </a:solidFill>
             <a:tailEnd type="arrow"/>
           </a:ln>
@@ -4480,7 +4358,7 @@
           </a:prstGeom>
           <a:ln w="25400">
             <a:solidFill>
-              <a:srgbClr val="FFC000"/>
+              <a:srgbClr val="FF0000"/>
             </a:solidFill>
             <a:tailEnd type="arrow"/>
           </a:ln>
@@ -4560,96 +4438,19 @@
           </a:prstGeom>
           <a:ln w="25400">
             <a:solidFill>
-              <a:srgbClr val="FFC000"/>
-            </a:solidFill>
-            <a:tailEnd type="arrow"/>
-          </a:ln>
-        </p:spPr>
-        <p:style>
-          <a:lnRef idx="1">
-            <a:schemeClr val="accent1"/>
-          </a:lnRef>
-          <a:fillRef idx="0">
-            <a:schemeClr val="accent1"/>
-          </a:fillRef>
-          <a:effectRef idx="0">
-            <a:schemeClr val="accent1"/>
-          </a:effectRef>
-          <a:fontRef idx="minor">
-            <a:schemeClr val="tx1"/>
-          </a:fontRef>
-        </p:style>
-      </p:cxnSp>
-      <p:cxnSp>
-        <p:nvCxnSpPr>
-          <p:cNvPr id="150" name="Straight Arrow Connector 149"/>
-          <p:cNvCxnSpPr>
-            <a:stCxn id="5" idx="0"/>
-            <a:endCxn id="28" idx="2"/>
-          </p:cNvCxnSpPr>
-          <p:nvPr/>
-        </p:nvCxnSpPr>
-        <p:spPr>
-          <a:xfrm flipV="1">
-            <a:off x="8983532" y="1649053"/>
-            <a:ext cx="0" cy="967818"/>
-          </a:xfrm>
-          <a:prstGeom prst="straightConnector1">
-            <a:avLst/>
-          </a:prstGeom>
-          <a:ln w="25400">
-            <a:solidFill>
-              <a:schemeClr val="accent6"/>
-            </a:solidFill>
-            <a:tailEnd type="arrow"/>
-          </a:ln>
-          <a:effectLst/>
-        </p:spPr>
-        <p:style>
-          <a:lnRef idx="2">
-            <a:schemeClr val="accent1"/>
-          </a:lnRef>
-          <a:fillRef idx="0">
-            <a:schemeClr val="accent1"/>
-          </a:fillRef>
-          <a:effectRef idx="1">
-            <a:schemeClr val="accent1"/>
-          </a:effectRef>
-          <a:fontRef idx="minor">
-            <a:schemeClr val="tx1"/>
-          </a:fontRef>
-        </p:style>
-      </p:cxnSp>
-      <p:cxnSp>
-        <p:nvCxnSpPr>
-          <p:cNvPr id="153" name="Straight Arrow Connector 152"/>
-          <p:cNvCxnSpPr/>
-          <p:nvPr/>
-        </p:nvCxnSpPr>
-        <p:spPr>
-          <a:xfrm flipV="1">
-            <a:off x="9295702" y="1649053"/>
-            <a:ext cx="0" cy="967818"/>
-          </a:xfrm>
-          <a:prstGeom prst="straightConnector1">
-            <a:avLst/>
-          </a:prstGeom>
-          <a:ln w="25400">
-            <a:solidFill>
               <a:srgbClr val="FF0000"/>
             </a:solidFill>
             <a:tailEnd type="arrow"/>
           </a:ln>
-          <a:effectLst/>
         </p:spPr>
         <p:style>
-          <a:lnRef idx="2">
+          <a:lnRef idx="1">
             <a:schemeClr val="accent1"/>
           </a:lnRef>
           <a:fillRef idx="0">
             <a:schemeClr val="accent1"/>
           </a:fillRef>
-          <a:effectRef idx="1">
+          <a:effectRef idx="0">
             <a:schemeClr val="accent1"/>
           </a:effectRef>
           <a:fontRef idx="minor">
@@ -4661,15 +4462,14 @@
         <p:nvCxnSpPr>
           <p:cNvPr id="154" name="Straight Arrow Connector 153"/>
           <p:cNvCxnSpPr>
-            <a:stCxn id="28" idx="1"/>
             <a:endCxn id="24" idx="3"/>
           </p:cNvCxnSpPr>
           <p:nvPr/>
         </p:nvCxnSpPr>
         <p:spPr>
-          <a:xfrm flipH="1" flipV="1">
-            <a:off x="7337613" y="1337118"/>
-            <a:ext cx="1097279" cy="1"/>
+          <a:xfrm flipH="1">
+            <a:off x="7337613" y="1337116"/>
+            <a:ext cx="1645919" cy="2"/>
           </a:xfrm>
           <a:prstGeom prst="straightConnector1">
             <a:avLst/>
@@ -4705,10 +4505,10 @@
         </p:nvGrpSpPr>
         <p:grpSpPr>
           <a:xfrm>
-            <a:off x="1262022" y="4855899"/>
-            <a:ext cx="2240346" cy="1020406"/>
+            <a:off x="1297235" y="4855899"/>
+            <a:ext cx="2240346" cy="785789"/>
             <a:chOff x="516835" y="4831065"/>
-            <a:chExt cx="2240346" cy="1020406"/>
+            <a:chExt cx="2240346" cy="785789"/>
           </a:xfrm>
         </p:grpSpPr>
         <p:cxnSp>
@@ -4783,51 +4583,13 @@
         </p:cxnSp>
         <p:cxnSp>
           <p:nvCxnSpPr>
-            <p:cNvPr id="48" name="Straight Connector 47"/>
-            <p:cNvCxnSpPr/>
-            <p:nvPr/>
-          </p:nvCxnSpPr>
-          <p:spPr>
-            <a:xfrm>
-              <a:off x="516835" y="5479768"/>
-              <a:ext cx="808382" cy="0"/>
-            </a:xfrm>
-            <a:prstGeom prst="line">
-              <a:avLst/>
-            </a:prstGeom>
-            <a:ln w="28575">
-              <a:solidFill>
-                <a:schemeClr val="accent4">
-                  <a:lumMod val="60000"/>
-                  <a:lumOff val="40000"/>
-                </a:schemeClr>
-              </a:solidFill>
-            </a:ln>
-          </p:spPr>
-          <p:style>
-            <a:lnRef idx="1">
-              <a:schemeClr val="accent1"/>
-            </a:lnRef>
-            <a:fillRef idx="0">
-              <a:schemeClr val="accent1"/>
-            </a:fillRef>
-            <a:effectRef idx="0">
-              <a:schemeClr val="accent1"/>
-            </a:effectRef>
-            <a:fontRef idx="minor">
-              <a:schemeClr val="tx1"/>
-            </a:fontRef>
-          </p:style>
-        </p:cxnSp>
-        <p:cxnSp>
-          <p:nvCxnSpPr>
             <p:cNvPr id="49" name="Straight Connector 48"/>
             <p:cNvCxnSpPr/>
             <p:nvPr/>
           </p:nvCxnSpPr>
           <p:spPr>
             <a:xfrm>
-              <a:off x="516835" y="5719163"/>
+              <a:off x="516835" y="5478354"/>
               <a:ext cx="808382" cy="0"/>
             </a:xfrm>
             <a:prstGeom prst="line">
@@ -4916,13 +4678,13 @@
         </p:sp>
         <p:sp>
           <p:nvSpPr>
-            <p:cNvPr id="51" name="TextBox 50"/>
+            <p:cNvPr id="52" name="TextBox 51"/>
             <p:cNvSpPr txBox="1"/>
             <p:nvPr/>
           </p:nvSpPr>
           <p:spPr>
             <a:xfrm>
-              <a:off x="1393794" y="5341268"/>
+              <a:off x="1391481" y="5339855"/>
               <a:ext cx="930383" cy="276999"/>
             </a:xfrm>
             <a:prstGeom prst="rect">
@@ -4944,37 +4706,118 @@
             </a:p>
           </p:txBody>
         </p:sp>
-        <p:sp>
-          <p:nvSpPr>
-            <p:cNvPr id="52" name="TextBox 51"/>
-            <p:cNvSpPr txBox="1"/>
-            <p:nvPr/>
-          </p:nvSpPr>
-          <p:spPr>
-            <a:xfrm>
-              <a:off x="1388866" y="5574472"/>
-              <a:ext cx="918393" cy="276999"/>
-            </a:xfrm>
-            <a:prstGeom prst="rect">
-              <a:avLst/>
-            </a:prstGeom>
-            <a:noFill/>
-          </p:spPr>
-          <p:txBody>
-            <a:bodyPr wrap="none" rtlCol="0">
-              <a:spAutoFit/>
-            </a:bodyPr>
-            <a:lstStyle/>
-            <a:p>
-              <a:r>
-                <a:rPr lang="en-US" sz="1200" dirty="0" smtClean="0"/>
-                <a:t>Localization</a:t>
-              </a:r>
-              <a:endParaRPr lang="en-US" sz="1200" dirty="0"/>
-            </a:p>
-          </p:txBody>
-        </p:sp>
       </p:grpSp>
+      <p:cxnSp>
+        <p:nvCxnSpPr>
+          <p:cNvPr id="53" name="Straight Connector 52"/>
+          <p:cNvCxnSpPr/>
+          <p:nvPr/>
+        </p:nvCxnSpPr>
+        <p:spPr>
+          <a:xfrm flipV="1">
+            <a:off x="11207112" y="2620380"/>
+            <a:ext cx="0" cy="450480"/>
+          </a:xfrm>
+          <a:prstGeom prst="line">
+            <a:avLst/>
+          </a:prstGeom>
+          <a:ln w="25400">
+            <a:solidFill>
+              <a:srgbClr val="FF0000"/>
+            </a:solidFill>
+          </a:ln>
+          <a:effectLst/>
+        </p:spPr>
+        <p:style>
+          <a:lnRef idx="1">
+            <a:schemeClr val="accent1"/>
+          </a:lnRef>
+          <a:fillRef idx="0">
+            <a:schemeClr val="accent1"/>
+          </a:fillRef>
+          <a:effectRef idx="0">
+            <a:schemeClr val="accent1"/>
+          </a:effectRef>
+          <a:fontRef idx="minor">
+            <a:schemeClr val="tx1"/>
+          </a:fontRef>
+        </p:style>
+      </p:cxnSp>
+      <p:cxnSp>
+        <p:nvCxnSpPr>
+          <p:cNvPr id="54" name="Straight Arrow Connector 53"/>
+          <p:cNvCxnSpPr>
+            <a:endCxn id="5" idx="3"/>
+          </p:cNvCxnSpPr>
+          <p:nvPr/>
+        </p:nvCxnSpPr>
+        <p:spPr>
+          <a:xfrm flipH="1">
+            <a:off x="9532172" y="3070860"/>
+            <a:ext cx="1674940" cy="0"/>
+          </a:xfrm>
+          <a:prstGeom prst="straightConnector1">
+            <a:avLst/>
+          </a:prstGeom>
+          <a:ln w="25400">
+            <a:solidFill>
+              <a:srgbClr val="FF0000"/>
+            </a:solidFill>
+            <a:tailEnd type="arrow"/>
+          </a:ln>
+          <a:effectLst/>
+        </p:spPr>
+        <p:style>
+          <a:lnRef idx="2">
+            <a:schemeClr val="accent1"/>
+          </a:lnRef>
+          <a:fillRef idx="0">
+            <a:schemeClr val="accent1"/>
+          </a:fillRef>
+          <a:effectRef idx="1">
+            <a:schemeClr val="accent1"/>
+          </a:effectRef>
+          <a:fontRef idx="minor">
+            <a:schemeClr val="tx1"/>
+          </a:fontRef>
+        </p:style>
+      </p:cxnSp>
+      <p:cxnSp>
+        <p:nvCxnSpPr>
+          <p:cNvPr id="57" name="Straight Connector 56"/>
+          <p:cNvCxnSpPr/>
+          <p:nvPr/>
+        </p:nvCxnSpPr>
+        <p:spPr>
+          <a:xfrm>
+            <a:off x="8972271" y="1337115"/>
+            <a:ext cx="0" cy="1279756"/>
+          </a:xfrm>
+          <a:prstGeom prst="line">
+            <a:avLst/>
+          </a:prstGeom>
+          <a:ln w="25400">
+            <a:solidFill>
+              <a:schemeClr val="accent6"/>
+            </a:solidFill>
+          </a:ln>
+          <a:effectLst/>
+        </p:spPr>
+        <p:style>
+          <a:lnRef idx="1">
+            <a:schemeClr val="accent1"/>
+          </a:lnRef>
+          <a:fillRef idx="0">
+            <a:schemeClr val="accent1"/>
+          </a:fillRef>
+          <a:effectRef idx="0">
+            <a:schemeClr val="accent1"/>
+          </a:effectRef>
+          <a:fontRef idx="minor">
+            <a:schemeClr val="tx1"/>
+          </a:fontRef>
+        </p:style>
+      </p:cxnSp>
     </p:spTree>
     <p:extLst>
       <p:ext uri="{BB962C8B-B14F-4D97-AF65-F5344CB8AC3E}">

</xml_diff>